<commit_message>
fine tune bellman pres
</commit_message>
<xml_diff>
--- a/Presentations/AI - Bellman Intro.pptx
+++ b/Presentations/AI - Bellman Intro.pptx
@@ -206,7 +206,7 @@
           <a:p>
             <a:fld id="{FAF957FC-5175-49AC-8D2B-2F056FFFC1DD}" type="datetimeFigureOut">
               <a:rPr lang="en-US" smtClean="0"/>
-              <a:t>7/28/2017</a:t>
+              <a:t>7/29/2017</a:t>
             </a:fld>
             <a:endParaRPr lang="en-US"/>
           </a:p>
@@ -656,7 +656,7 @@
             <a:fld id="{1D8BD707-D9CF-40AE-B4C6-C98DA3205C09}" type="datetimeFigureOut">
               <a:rPr lang="en-US" smtClean="0"/>
               <a:pPr/>
-              <a:t>7/28/2017</a:t>
+              <a:t>7/29/2017</a:t>
             </a:fld>
             <a:endParaRPr lang="en-US"/>
           </a:p>
@@ -823,7 +823,7 @@
             <a:fld id="{1D8BD707-D9CF-40AE-B4C6-C98DA3205C09}" type="datetimeFigureOut">
               <a:rPr lang="en-US" smtClean="0"/>
               <a:pPr/>
-              <a:t>7/28/2017</a:t>
+              <a:t>7/29/2017</a:t>
             </a:fld>
             <a:endParaRPr lang="en-US"/>
           </a:p>
@@ -1000,7 +1000,7 @@
             <a:fld id="{1D8BD707-D9CF-40AE-B4C6-C98DA3205C09}" type="datetimeFigureOut">
               <a:rPr lang="en-US" smtClean="0"/>
               <a:pPr/>
-              <a:t>7/28/2017</a:t>
+              <a:t>7/29/2017</a:t>
             </a:fld>
             <a:endParaRPr lang="en-US"/>
           </a:p>
@@ -1167,7 +1167,7 @@
             <a:fld id="{1D8BD707-D9CF-40AE-B4C6-C98DA3205C09}" type="datetimeFigureOut">
               <a:rPr lang="en-US" smtClean="0"/>
               <a:pPr/>
-              <a:t>7/28/2017</a:t>
+              <a:t>7/29/2017</a:t>
             </a:fld>
             <a:endParaRPr lang="en-US"/>
           </a:p>
@@ -1410,7 +1410,7 @@
             <a:fld id="{1D8BD707-D9CF-40AE-B4C6-C98DA3205C09}" type="datetimeFigureOut">
               <a:rPr lang="en-US" smtClean="0"/>
               <a:pPr/>
-              <a:t>7/28/2017</a:t>
+              <a:t>7/29/2017</a:t>
             </a:fld>
             <a:endParaRPr lang="en-US"/>
           </a:p>
@@ -1695,7 +1695,7 @@
             <a:fld id="{1D8BD707-D9CF-40AE-B4C6-C98DA3205C09}" type="datetimeFigureOut">
               <a:rPr lang="en-US" smtClean="0"/>
               <a:pPr/>
-              <a:t>7/28/2017</a:t>
+              <a:t>7/29/2017</a:t>
             </a:fld>
             <a:endParaRPr lang="en-US"/>
           </a:p>
@@ -2114,7 +2114,7 @@
             <a:fld id="{1D8BD707-D9CF-40AE-B4C6-C98DA3205C09}" type="datetimeFigureOut">
               <a:rPr lang="en-US" smtClean="0"/>
               <a:pPr/>
-              <a:t>7/28/2017</a:t>
+              <a:t>7/29/2017</a:t>
             </a:fld>
             <a:endParaRPr lang="en-US"/>
           </a:p>
@@ -2229,7 +2229,7 @@
             <a:fld id="{1D8BD707-D9CF-40AE-B4C6-C98DA3205C09}" type="datetimeFigureOut">
               <a:rPr lang="en-US" smtClean="0"/>
               <a:pPr/>
-              <a:t>7/28/2017</a:t>
+              <a:t>7/29/2017</a:t>
             </a:fld>
             <a:endParaRPr lang="en-US"/>
           </a:p>
@@ -2321,7 +2321,7 @@
             <a:fld id="{1D8BD707-D9CF-40AE-B4C6-C98DA3205C09}" type="datetimeFigureOut">
               <a:rPr lang="en-US" smtClean="0"/>
               <a:pPr/>
-              <a:t>7/28/2017</a:t>
+              <a:t>7/29/2017</a:t>
             </a:fld>
             <a:endParaRPr lang="en-US"/>
           </a:p>
@@ -2595,7 +2595,7 @@
             <a:fld id="{1D8BD707-D9CF-40AE-B4C6-C98DA3205C09}" type="datetimeFigureOut">
               <a:rPr lang="en-US" smtClean="0"/>
               <a:pPr/>
-              <a:t>7/28/2017</a:t>
+              <a:t>7/29/2017</a:t>
             </a:fld>
             <a:endParaRPr lang="en-US"/>
           </a:p>
@@ -2845,7 +2845,7 @@
             <a:fld id="{1D8BD707-D9CF-40AE-B4C6-C98DA3205C09}" type="datetimeFigureOut">
               <a:rPr lang="en-US" smtClean="0"/>
               <a:pPr/>
-              <a:t>7/28/2017</a:t>
+              <a:t>7/29/2017</a:t>
             </a:fld>
             <a:endParaRPr lang="en-US"/>
           </a:p>
@@ -3055,7 +3055,7 @@
             <a:fld id="{1D8BD707-D9CF-40AE-B4C6-C98DA3205C09}" type="datetimeFigureOut">
               <a:rPr lang="en-US" smtClean="0"/>
               <a:pPr/>
-              <a:t>7/28/2017</a:t>
+              <a:t>7/29/2017</a:t>
             </a:fld>
             <a:endParaRPr lang="en-US"/>
           </a:p>
@@ -3817,7 +3817,7 @@
         <p:spPr>
           <a:xfrm>
             <a:off x="152400" y="1164134"/>
-            <a:ext cx="8763000" cy="5201424"/>
+            <a:ext cx="8763000" cy="5509200"/>
           </a:xfrm>
           <a:prstGeom prst="rect">
             <a:avLst/>
@@ -3844,6 +3844,25 @@
               </a:rPr>
               <a:t>Terminology</a:t>
             </a:r>
+            <a:r>
+              <a:rPr lang="en-US" sz="2000" b="1" dirty="0" smtClean="0">
+                <a:solidFill>
+                  <a:schemeClr val="accent5">
+                    <a:lumMod val="75000"/>
+                  </a:schemeClr>
+                </a:solidFill>
+              </a:rPr>
+              <a:t/>
+            </a:r>
+            <a:br>
+              <a:rPr lang="en-US" sz="2000" b="1" dirty="0" smtClean="0">
+                <a:solidFill>
+                  <a:schemeClr val="accent5">
+                    <a:lumMod val="75000"/>
+                  </a:schemeClr>
+                </a:solidFill>
+              </a:rPr>
+            </a:br>
             <a:endParaRPr lang="en-US" sz="2000" b="1" dirty="0">
               <a:solidFill>
                 <a:schemeClr val="accent5">
@@ -4150,7 +4169,19 @@
             </a:r>
           </a:p>
           <a:p>
-            <a:endParaRPr lang="en-US" sz="2000" b="1" dirty="0" smtClean="0"/>
+            <a:r>
+              <a:rPr lang="en-US" sz="2000" b="1" dirty="0"/>
+              <a:t> </a:t>
+            </a:r>
+            <a:r>
+              <a:rPr lang="en-US" sz="2000" b="1" dirty="0" smtClean="0"/>
+              <a:t>			             </a:t>
+            </a:r>
+            <a:r>
+              <a:rPr lang="en-US" sz="2000" b="1" baseline="30000" dirty="0" smtClean="0"/>
+              <a:t>a</a:t>
+            </a:r>
+            <a:endParaRPr lang="en-US" sz="2000" b="1" baseline="30000" dirty="0"/>
           </a:p>
         </p:txBody>
       </p:sp>
@@ -4162,7 +4193,7 @@
         </p:nvSpPr>
         <p:spPr>
           <a:xfrm>
-            <a:off x="5257800" y="5181600"/>
+            <a:off x="5257800" y="5524500"/>
             <a:ext cx="1066800" cy="381000"/>
           </a:xfrm>
           <a:prstGeom prst="downArrow">
@@ -8644,13 +8675,6 @@
               </a:rPr>
               <a:t> (act as if deterministic).</a:t>
             </a:r>
-            <a:endParaRPr lang="en-US" sz="2800" b="1" dirty="0" smtClean="0">
-              <a:solidFill>
-                <a:schemeClr val="accent5">
-                  <a:lumMod val="75000"/>
-                </a:schemeClr>
-              </a:solidFill>
-            </a:endParaRPr>
           </a:p>
         </p:txBody>
       </p:sp>
@@ -11881,6 +11905,80 @@
           </a:p>
         </p:txBody>
       </p:sp>
+      <p:sp>
+        <p:nvSpPr>
+          <p:cNvPr id="4" name="TextBox 3"/>
+          <p:cNvSpPr txBox="1"/>
+          <p:nvPr/>
+        </p:nvSpPr>
+        <p:spPr>
+          <a:xfrm>
+            <a:off x="2900371" y="3334464"/>
+            <a:ext cx="729302" cy="307777"/>
+          </a:xfrm>
+          <a:prstGeom prst="rect">
+            <a:avLst/>
+          </a:prstGeom>
+          <a:noFill/>
+        </p:spPr>
+        <p:txBody>
+          <a:bodyPr wrap="none" rtlCol="0">
+            <a:spAutoFit/>
+          </a:bodyPr>
+          <a:lstStyle/>
+          <a:p>
+            <a:r>
+              <a:rPr lang="en-US" sz="1400" dirty="0" smtClean="0">
+                <a:solidFill>
+                  <a:srgbClr val="FF0000"/>
+                </a:solidFill>
+              </a:rPr>
+              <a:t>Penalty</a:t>
+            </a:r>
+            <a:endParaRPr lang="en-US" sz="1400" dirty="0">
+              <a:solidFill>
+                <a:srgbClr val="FF0000"/>
+              </a:solidFill>
+            </a:endParaRPr>
+          </a:p>
+        </p:txBody>
+      </p:sp>
+      <p:cxnSp>
+        <p:nvCxnSpPr>
+          <p:cNvPr id="17" name="Straight Arrow Connector 16"/>
+          <p:cNvCxnSpPr/>
+          <p:nvPr/>
+        </p:nvCxnSpPr>
+        <p:spPr>
+          <a:xfrm flipH="1">
+            <a:off x="2362200" y="3488353"/>
+            <a:ext cx="538171" cy="153888"/>
+          </a:xfrm>
+          <a:prstGeom prst="straightConnector1">
+            <a:avLst/>
+          </a:prstGeom>
+          <a:ln>
+            <a:solidFill>
+              <a:srgbClr val="FF0000"/>
+            </a:solidFill>
+            <a:tailEnd type="arrow"/>
+          </a:ln>
+        </p:spPr>
+        <p:style>
+          <a:lnRef idx="1">
+            <a:schemeClr val="accent1"/>
+          </a:lnRef>
+          <a:fillRef idx="0">
+            <a:schemeClr val="accent1"/>
+          </a:fillRef>
+          <a:effectRef idx="0">
+            <a:schemeClr val="accent1"/>
+          </a:effectRef>
+          <a:fontRef idx="minor">
+            <a:schemeClr val="tx1"/>
+          </a:fontRef>
+        </p:style>
+      </p:cxnSp>
     </p:spTree>
     <p:extLst>
       <p:ext uri="{BB962C8B-B14F-4D97-AF65-F5344CB8AC3E}">
@@ -12481,13 +12579,6 @@
               </a:rPr>
               <a:t>Non-Deterministic</a:t>
             </a:r>
-            <a:endParaRPr lang="en-US" sz="2400" b="1" dirty="0" smtClean="0">
-              <a:solidFill>
-                <a:schemeClr val="accent6">
-                  <a:lumMod val="75000"/>
-                </a:schemeClr>
-              </a:solidFill>
-            </a:endParaRPr>
           </a:p>
           <a:p>
             <a:pPr marL="742950" lvl="1" indent="-285750">
@@ -15945,11 +16036,7 @@
           <a:p>
             <a:r>
               <a:rPr lang="en-US" sz="1200" b="1" dirty="0" smtClean="0"/>
-              <a:t>Goal </a:t>
-            </a:r>
-            <a:r>
-              <a:rPr lang="en-US" sz="1200" b="1" dirty="0" smtClean="0"/>
-              <a:t>Node</a:t>
+              <a:t>Goal Node</a:t>
             </a:r>
             <a:br>
               <a:rPr lang="en-US" sz="1200" b="1" dirty="0" smtClean="0"/>
@@ -17066,11 +17153,7 @@
           <a:p>
             <a:r>
               <a:rPr lang="en-US" sz="1200" b="1" dirty="0" smtClean="0"/>
-              <a:t>Goal </a:t>
-            </a:r>
-            <a:r>
-              <a:rPr lang="en-US" sz="1200" b="1" dirty="0" smtClean="0"/>
-              <a:t>Node, R =1 </a:t>
+              <a:t>Goal Node, R =1 </a:t>
             </a:r>
             <a:endParaRPr lang="en-US" sz="1200" b="1" dirty="0"/>
           </a:p>
@@ -18002,7 +18085,7 @@
         </p:nvSpPr>
         <p:spPr>
           <a:xfrm>
-            <a:off x="4810559" y="3948231"/>
+            <a:off x="4685676" y="3943587"/>
             <a:ext cx="2574294" cy="523220"/>
           </a:xfrm>
           <a:prstGeom prst="rect">
@@ -18069,7 +18152,7 @@
         </p:nvCxnSpPr>
         <p:spPr>
           <a:xfrm flipV="1">
-            <a:off x="5029200" y="3534014"/>
+            <a:off x="4898945" y="3500796"/>
             <a:ext cx="0" cy="414217"/>
           </a:xfrm>
           <a:prstGeom prst="straightConnector1">
@@ -18107,7 +18190,7 @@
         </p:nvCxnSpPr>
         <p:spPr>
           <a:xfrm flipH="1">
-            <a:off x="7162800" y="2747856"/>
+            <a:off x="6927948" y="2727988"/>
             <a:ext cx="222053" cy="402492"/>
           </a:xfrm>
           <a:prstGeom prst="straightConnector1">
@@ -18450,11 +18533,7 @@
           <a:p>
             <a:r>
               <a:rPr lang="en-US" sz="1200" b="1" dirty="0" smtClean="0"/>
-              <a:t>Goal </a:t>
-            </a:r>
-            <a:r>
-              <a:rPr lang="en-US" sz="1200" b="1" dirty="0" smtClean="0"/>
-              <a:t>Node, R =1 </a:t>
+              <a:t>Goal Node, R =1 </a:t>
             </a:r>
             <a:endParaRPr lang="en-US" sz="1200" b="1" dirty="0"/>
           </a:p>
@@ -18959,11 +19038,7 @@
           <a:p>
             <a:r>
               <a:rPr lang="en-US" sz="1200" b="1" dirty="0" smtClean="0"/>
-              <a:t>Goal </a:t>
-            </a:r>
-            <a:r>
-              <a:rPr lang="en-US" sz="1200" b="1" dirty="0" smtClean="0"/>
-              <a:t>Node, R =1 </a:t>
+              <a:t>Goal Node, R =1 </a:t>
             </a:r>
             <a:endParaRPr lang="en-US" sz="1200" b="1" dirty="0"/>
           </a:p>

</xml_diff>

<commit_message>
more fine tune bellman pres
</commit_message>
<xml_diff>
--- a/Presentations/AI - Bellman Intro.pptx
+++ b/Presentations/AI - Bellman Intro.pptx
@@ -3892,26 +3892,14 @@
             </a:r>
             <a:r>
               <a:rPr lang="en-US" sz="2000" b="1" dirty="0" smtClean="0"/>
-              <a:t>)        </a:t>
-            </a:r>
-            <a:r>
-              <a:rPr lang="en-US" sz="2000" b="1" dirty="0" smtClean="0"/>
-              <a:t> -&gt; </a:t>
-            </a:r>
-            <a:r>
-              <a:rPr lang="en-US" sz="2000" b="1" dirty="0" smtClean="0"/>
-              <a:t>The Reward when at state s and action a is taken.</a:t>
+              <a:t>)         -&gt; The Reward when at state s and action a is taken.</a:t>
             </a:r>
             <a:br>
               <a:rPr lang="en-US" sz="2000" b="1" dirty="0" smtClean="0"/>
             </a:br>
             <a:r>
               <a:rPr lang="en-US" sz="2000" b="1" dirty="0" smtClean="0"/>
-              <a:t>	</a:t>
-            </a:r>
-            <a:r>
-              <a:rPr lang="en-US" sz="2000" b="1" dirty="0" smtClean="0"/>
-              <a:t>P(s,a,S</a:t>
+              <a:t>	P(s,a,S</a:t>
             </a:r>
             <a:r>
               <a:rPr lang="en-US" sz="2000" b="1" baseline="-25000" dirty="0" smtClean="0"/>
@@ -3919,21 +3907,8 @@
             </a:r>
             <a:r>
               <a:rPr lang="en-US" sz="2000" b="1" dirty="0" smtClean="0"/>
-              <a:t>) </a:t>
-            </a:r>
-            <a:r>
-              <a:rPr lang="en-US" sz="2000" b="1" dirty="0" smtClean="0"/>
-              <a:t>-&gt; The </a:t>
-            </a:r>
-            <a:r>
-              <a:rPr lang="en-US" sz="2000" b="1" dirty="0" smtClean="0"/>
-              <a:t>probabilities </a:t>
-            </a:r>
-            <a:r>
-              <a:rPr lang="en-US" sz="2000" b="1" dirty="0" smtClean="0"/>
-              <a:t>that when at state s and action a is taken, </a:t>
-            </a:r>
-            <a:endParaRPr lang="en-US" sz="2000" b="1" dirty="0" smtClean="0"/>
+              <a:t>) -&gt; The probabilities that when at state s and action a is taken, </a:t>
+            </a:r>
           </a:p>
           <a:p>
             <a:r>
@@ -3942,11 +3917,7 @@
             </a:r>
             <a:r>
               <a:rPr lang="en-US" sz="2000" b="1" dirty="0" smtClean="0"/>
-              <a:t>	        </a:t>
-            </a:r>
-            <a:r>
-              <a:rPr lang="en-US" sz="2000" b="1" dirty="0" smtClean="0"/>
-              <a:t>of</a:t>
+              <a:t>	        of</a:t>
             </a:r>
             <a:r>
               <a:rPr lang="en-US" sz="2000" b="1" dirty="0"/>
@@ -3954,19 +3925,7 @@
             </a:r>
             <a:r>
               <a:rPr lang="en-US" sz="2000" b="1" dirty="0" smtClean="0"/>
-              <a:t>being </a:t>
-            </a:r>
-            <a:r>
-              <a:rPr lang="en-US" sz="2000" b="1" dirty="0" smtClean="0"/>
-              <a:t>in </a:t>
-            </a:r>
-            <a:r>
-              <a:rPr lang="en-US" sz="2000" b="1" dirty="0" smtClean="0"/>
-              <a:t>one of the </a:t>
-            </a:r>
-            <a:r>
-              <a:rPr lang="en-US" sz="2000" b="1" dirty="0" smtClean="0"/>
-              <a:t>successor states S</a:t>
+              <a:t>being in one of the successor states S</a:t>
             </a:r>
             <a:r>
               <a:rPr lang="en-US" sz="2000" b="1" baseline="-25000" dirty="0" smtClean="0"/>
@@ -3976,7 +3935,6 @@
               <a:rPr lang="en-US" sz="2000" b="1" dirty="0" smtClean="0"/>
               <a:t>.</a:t>
             </a:r>
-            <a:endParaRPr lang="en-US" sz="2000" b="1" dirty="0" smtClean="0"/>
           </a:p>
           <a:p>
             <a:pPr marL="285750" indent="-285750">
@@ -4084,7 +4042,15 @@
             </a:r>
             <a:r>
               <a:rPr lang="en-US" sz="2000" b="1" dirty="0"/>
-              <a:t>) ) + </a:t>
+              <a:t>) </a:t>
+            </a:r>
+            <a:r>
+              <a:rPr lang="en-US" sz="2000" b="1" dirty="0" smtClean="0"/>
+              <a:t> </a:t>
+            </a:r>
+            <a:r>
+              <a:rPr lang="en-US" sz="2000" b="1" dirty="0"/>
+              <a:t>+ </a:t>
             </a:r>
             <a:r>
               <a:rPr lang="el-GR" sz="2000" b="1" dirty="0"/>
@@ -4104,18 +4070,20 @@
             </a:r>
             <a:r>
               <a:rPr lang="en-US" sz="2000" b="1" dirty="0" smtClean="0"/>
-              <a:t>)</a:t>
-            </a:r>
+              <a:t>) )</a:t>
+            </a:r>
+            <a:endParaRPr lang="en-US" sz="2000" b="1" dirty="0" smtClean="0"/>
           </a:p>
           <a:p>
             <a:r>
               <a:rPr lang="en-US" sz="2000" b="1" dirty="0" smtClean="0"/>
-              <a:t>			             </a:t>
+              <a:t>			            </a:t>
             </a:r>
             <a:r>
               <a:rPr lang="en-US" sz="2000" b="1" baseline="30000" dirty="0" smtClean="0"/>
               <a:t>a</a:t>
             </a:r>
+            <a:endParaRPr lang="en-US" sz="2000" b="1" baseline="30000" dirty="0" smtClean="0"/>
           </a:p>
           <a:p>
             <a:pPr algn="ctr"/>
@@ -4149,7 +4117,11 @@
             </a:r>
             <a:r>
               <a:rPr lang="en-US" sz="2000" b="1" dirty="0" smtClean="0"/>
-              <a:t>) + </a:t>
+              <a:t> </a:t>
+            </a:r>
+            <a:r>
+              <a:rPr lang="en-US" sz="2000" b="1" dirty="0" smtClean="0"/>
+              <a:t>+ </a:t>
             </a:r>
             <a:r>
               <a:rPr lang="el-GR" sz="2000" b="1" dirty="0" smtClean="0"/>
@@ -4211,11 +4183,15 @@
             </a:r>
             <a:r>
               <a:rPr lang="en-US" sz="2000" b="1" baseline="-25000" dirty="0" smtClean="0"/>
-              <a:t>t+1’</a:t>
+              <a:t>t+1</a:t>
+            </a:r>
+            <a:r>
+              <a:rPr lang="en-US" sz="2000" b="1" baseline="-25000" dirty="0" smtClean="0"/>
+              <a:t>’</a:t>
             </a:r>
             <a:r>
               <a:rPr lang="en-US" sz="2000" b="1" dirty="0" smtClean="0"/>
-              <a:t>)</a:t>
+              <a:t>) )</a:t>
             </a:r>
             <a:endParaRPr lang="en-US" sz="2000" b="1" dirty="0"/>
           </a:p>
@@ -4226,15 +4202,19 @@
             </a:r>
             <a:r>
               <a:rPr lang="en-US" sz="2000" b="1" dirty="0" smtClean="0"/>
-              <a:t>			             </a:t>
+              <a:t>			            </a:t>
             </a:r>
             <a:r>
               <a:rPr lang="en-US" sz="2000" b="1" baseline="30000" dirty="0" smtClean="0"/>
-              <a:t>a		</a:t>
+              <a:t>a</a:t>
+            </a:r>
+            <a:r>
+              <a:rPr lang="en-US" sz="2000" b="1" baseline="30000" dirty="0" smtClean="0"/>
+              <a:t>		</a:t>
             </a:r>
             <a:r>
               <a:rPr lang="en-US" sz="2000" b="1" dirty="0" smtClean="0"/>
-              <a:t>         </a:t>
+              <a:t>        </a:t>
             </a:r>
             <a:r>
               <a:rPr lang="en-US" sz="1400" b="1" dirty="0" smtClean="0"/>
@@ -4242,7 +4222,11 @@
             </a:r>
             <a:r>
               <a:rPr lang="en-US" sz="1400" b="1" baseline="-25000" dirty="0" smtClean="0"/>
-              <a:t>t+1’</a:t>
+              <a:t>t+1</a:t>
+            </a:r>
+            <a:r>
+              <a:rPr lang="en-US" sz="1400" b="1" baseline="-25000" dirty="0" smtClean="0"/>
+              <a:t>’</a:t>
             </a:r>
             <a:endParaRPr lang="en-US" sz="1400" b="1" baseline="30000" dirty="0"/>
           </a:p>
@@ -19846,7 +19830,15 @@
             </a:r>
             <a:r>
               <a:rPr lang="en-US" sz="2000" b="1" dirty="0" smtClean="0"/>
-              <a:t>) ) + </a:t>
+              <a:t>) </a:t>
+            </a:r>
+            <a:r>
+              <a:rPr lang="en-US" sz="2000" b="1" dirty="0" smtClean="0"/>
+              <a:t> </a:t>
+            </a:r>
+            <a:r>
+              <a:rPr lang="en-US" sz="2000" b="1" dirty="0" smtClean="0"/>
+              <a:t>+ </a:t>
             </a:r>
             <a:r>
               <a:rPr lang="el-GR" sz="2000" b="1" dirty="0"/>
@@ -19870,7 +19862,7 @@
             </a:r>
             <a:r>
               <a:rPr lang="en-US" sz="2000" b="1" dirty="0" smtClean="0"/>
-              <a:t>)</a:t>
+              <a:t>) )</a:t>
             </a:r>
             <a:endParaRPr lang="en-US" sz="2000" b="1" dirty="0"/>
           </a:p>

</xml_diff>

<commit_message>
relabeling and typo fixes
</commit_message>
<xml_diff>
--- a/Presentations/AI - Bellman Intro.pptx
+++ b/Presentations/AI - Bellman Intro.pptx
@@ -206,7 +206,7 @@
           <a:p>
             <a:fld id="{FAF957FC-5175-49AC-8D2B-2F056FFFC1DD}" type="datetimeFigureOut">
               <a:rPr lang="en-US" smtClean="0"/>
-              <a:t>9/28/2017</a:t>
+              <a:t>10/25/2017</a:t>
             </a:fld>
             <a:endParaRPr lang="en-US"/>
           </a:p>
@@ -656,7 +656,7 @@
             <a:fld id="{1D8BD707-D9CF-40AE-B4C6-C98DA3205C09}" type="datetimeFigureOut">
               <a:rPr lang="en-US" smtClean="0"/>
               <a:pPr/>
-              <a:t>9/28/2017</a:t>
+              <a:t>10/25/2017</a:t>
             </a:fld>
             <a:endParaRPr lang="en-US"/>
           </a:p>
@@ -823,7 +823,7 @@
             <a:fld id="{1D8BD707-D9CF-40AE-B4C6-C98DA3205C09}" type="datetimeFigureOut">
               <a:rPr lang="en-US" smtClean="0"/>
               <a:pPr/>
-              <a:t>9/28/2017</a:t>
+              <a:t>10/25/2017</a:t>
             </a:fld>
             <a:endParaRPr lang="en-US"/>
           </a:p>
@@ -1000,7 +1000,7 @@
             <a:fld id="{1D8BD707-D9CF-40AE-B4C6-C98DA3205C09}" type="datetimeFigureOut">
               <a:rPr lang="en-US" smtClean="0"/>
               <a:pPr/>
-              <a:t>9/28/2017</a:t>
+              <a:t>10/25/2017</a:t>
             </a:fld>
             <a:endParaRPr lang="en-US"/>
           </a:p>
@@ -1167,7 +1167,7 @@
             <a:fld id="{1D8BD707-D9CF-40AE-B4C6-C98DA3205C09}" type="datetimeFigureOut">
               <a:rPr lang="en-US" smtClean="0"/>
               <a:pPr/>
-              <a:t>9/28/2017</a:t>
+              <a:t>10/25/2017</a:t>
             </a:fld>
             <a:endParaRPr lang="en-US"/>
           </a:p>
@@ -1410,7 +1410,7 @@
             <a:fld id="{1D8BD707-D9CF-40AE-B4C6-C98DA3205C09}" type="datetimeFigureOut">
               <a:rPr lang="en-US" smtClean="0"/>
               <a:pPr/>
-              <a:t>9/28/2017</a:t>
+              <a:t>10/25/2017</a:t>
             </a:fld>
             <a:endParaRPr lang="en-US"/>
           </a:p>
@@ -1695,7 +1695,7 @@
             <a:fld id="{1D8BD707-D9CF-40AE-B4C6-C98DA3205C09}" type="datetimeFigureOut">
               <a:rPr lang="en-US" smtClean="0"/>
               <a:pPr/>
-              <a:t>9/28/2017</a:t>
+              <a:t>10/25/2017</a:t>
             </a:fld>
             <a:endParaRPr lang="en-US"/>
           </a:p>
@@ -2114,7 +2114,7 @@
             <a:fld id="{1D8BD707-D9CF-40AE-B4C6-C98DA3205C09}" type="datetimeFigureOut">
               <a:rPr lang="en-US" smtClean="0"/>
               <a:pPr/>
-              <a:t>9/28/2017</a:t>
+              <a:t>10/25/2017</a:t>
             </a:fld>
             <a:endParaRPr lang="en-US"/>
           </a:p>
@@ -2229,7 +2229,7 @@
             <a:fld id="{1D8BD707-D9CF-40AE-B4C6-C98DA3205C09}" type="datetimeFigureOut">
               <a:rPr lang="en-US" smtClean="0"/>
               <a:pPr/>
-              <a:t>9/28/2017</a:t>
+              <a:t>10/25/2017</a:t>
             </a:fld>
             <a:endParaRPr lang="en-US"/>
           </a:p>
@@ -2321,7 +2321,7 @@
             <a:fld id="{1D8BD707-D9CF-40AE-B4C6-C98DA3205C09}" type="datetimeFigureOut">
               <a:rPr lang="en-US" smtClean="0"/>
               <a:pPr/>
-              <a:t>9/28/2017</a:t>
+              <a:t>10/25/2017</a:t>
             </a:fld>
             <a:endParaRPr lang="en-US"/>
           </a:p>
@@ -2595,7 +2595,7 @@
             <a:fld id="{1D8BD707-D9CF-40AE-B4C6-C98DA3205C09}" type="datetimeFigureOut">
               <a:rPr lang="en-US" smtClean="0"/>
               <a:pPr/>
-              <a:t>9/28/2017</a:t>
+              <a:t>10/25/2017</a:t>
             </a:fld>
             <a:endParaRPr lang="en-US"/>
           </a:p>
@@ -2845,7 +2845,7 @@
             <a:fld id="{1D8BD707-D9CF-40AE-B4C6-C98DA3205C09}" type="datetimeFigureOut">
               <a:rPr lang="en-US" smtClean="0"/>
               <a:pPr/>
-              <a:t>9/28/2017</a:t>
+              <a:t>10/25/2017</a:t>
             </a:fld>
             <a:endParaRPr lang="en-US"/>
           </a:p>
@@ -3055,7 +3055,7 @@
             <a:fld id="{1D8BD707-D9CF-40AE-B4C6-C98DA3205C09}" type="datetimeFigureOut">
               <a:rPr lang="en-US" smtClean="0"/>
               <a:pPr/>
-              <a:t>9/28/2017</a:t>
+              <a:t>10/25/2017</a:t>
             </a:fld>
             <a:endParaRPr lang="en-US"/>
           </a:p>
@@ -3497,8 +3497,15 @@
                   </a:schemeClr>
                 </a:solidFill>
               </a:rPr>
-              <a:t>Portland Data Science Group</a:t>
-            </a:r>
+              <a:t>Artificial Intelligence Training</a:t>
+            </a:r>
+            <a:endParaRPr lang="en-US" sz="2400" dirty="0" smtClean="0">
+              <a:solidFill>
+                <a:schemeClr val="accent1">
+                  <a:lumMod val="75000"/>
+                </a:schemeClr>
+              </a:solidFill>
+            </a:endParaRPr>
           </a:p>
           <a:p>
             <a:r>
@@ -3522,7 +3529,7 @@
               <a:t>Ferlitsch</a:t>
             </a:r>
             <a:r>
-              <a:rPr lang="en-US" sz="2400" dirty="0">
+              <a:rPr lang="en-US" sz="2400">
                 <a:solidFill>
                   <a:schemeClr val="accent1">
                     <a:lumMod val="75000"/>
@@ -3532,7 +3539,7 @@
               <a:t/>
             </a:r>
             <a:br>
-              <a:rPr lang="en-US" sz="2400" dirty="0">
+              <a:rPr lang="en-US" sz="2400">
                 <a:solidFill>
                   <a:schemeClr val="accent1">
                     <a:lumMod val="75000"/>
@@ -3541,35 +3548,31 @@
               </a:rPr>
             </a:br>
             <a:r>
-              <a:rPr lang="en-US" sz="2400" dirty="0">
+              <a:rPr lang="en-US" sz="2400" smtClean="0">
                 <a:solidFill>
                   <a:schemeClr val="accent1">
                     <a:lumMod val="75000"/>
                   </a:schemeClr>
                 </a:solidFill>
               </a:rPr>
-              <a:t>Community Outreach </a:t>
-            </a:r>
-            <a:r>
-              <a:rPr lang="en-US" sz="2400" dirty="0" smtClean="0">
+              <a:t>Instructor</a:t>
+            </a:r>
+            <a:br>
+              <a:rPr lang="en-US" sz="2400" smtClean="0">
                 <a:solidFill>
                   <a:schemeClr val="accent1">
                     <a:lumMod val="75000"/>
                   </a:schemeClr>
                 </a:solidFill>
               </a:rPr>
-              <a:t>Officer</a:t>
-            </a:r>
-            <a:r>
-              <a:rPr lang="en-US" sz="2400" dirty="0" smtClean="0"/>
-              <a:t/>
-            </a:r>
-            <a:br>
-              <a:rPr lang="en-US" sz="2400" dirty="0" smtClean="0"/>
             </a:br>
             <a:r>
+              <a:rPr lang="en-US" sz="1800" smtClean="0"/>
+              <a:t>July</a:t>
+            </a:r>
+            <a:r>
               <a:rPr lang="en-US" sz="1800" dirty="0" smtClean="0"/>
-              <a:t>July, 2017</a:t>
+              <a:t>, 2017</a:t>
             </a:r>
             <a:endParaRPr lang="en-US" sz="1800" dirty="0"/>
           </a:p>
@@ -5727,17 +5730,7 @@
                   </a:schemeClr>
                 </a:solidFill>
               </a:rPr>
-              <a:t>) = 0 + .9( .8(1) + .1(0) + .1(0</a:t>
-            </a:r>
-            <a:r>
-              <a:rPr lang="en-US" b="1" dirty="0" smtClean="0">
-                <a:solidFill>
-                  <a:schemeClr val="accent6">
-                    <a:lumMod val="50000"/>
-                  </a:schemeClr>
-                </a:solidFill>
-              </a:rPr>
-              <a:t>))</a:t>
+              <a:t>) = 0 + .9( .8(1) + .1(0) + .1(0))</a:t>
             </a:r>
             <a:endParaRPr lang="en-US" b="1" dirty="0">
               <a:solidFill>
@@ -7549,17 +7542,7 @@
                   </a:schemeClr>
                 </a:solidFill>
               </a:rPr>
-              <a:t>1</a:t>
-            </a:r>
-            <a:r>
-              <a:rPr lang="en-US" b="1" smtClean="0">
-                <a:solidFill>
-                  <a:schemeClr val="accent6">
-                    <a:lumMod val="50000"/>
-                  </a:schemeClr>
-                </a:solidFill>
-              </a:rPr>
-              <a:t>))</a:t>
+              <a:t>1))</a:t>
             </a:r>
             <a:endParaRPr lang="en-US" b="1" dirty="0">
               <a:solidFill>
@@ -14292,17 +14275,7 @@
                   </a:schemeClr>
                 </a:solidFill>
               </a:rPr>
-              <a:t>{ Down, </a:t>
-            </a:r>
-            <a:r>
-              <a:rPr lang="en-US" b="1" dirty="0" smtClean="0">
-                <a:solidFill>
-                  <a:schemeClr val="accent6">
-                    <a:lumMod val="50000"/>
-                  </a:schemeClr>
-                </a:solidFill>
-              </a:rPr>
-              <a:t>Left, Right </a:t>
+              <a:t>{ Down, Left, Right </a:t>
             </a:r>
             <a:r>
               <a:rPr lang="en-US" b="1" dirty="0">

</xml_diff>